<commit_message>
figma versao 2 ppt
</commit_message>
<xml_diff>
--- a/projeto-individual/Apresentação/Apresentação.pptx
+++ b/projeto-individual/Apresentação/Apresentação.pptx
@@ -7,7 +7,8 @@
   <p:sldIdLst>
     <p:sldId id="256" r:id="rId2"/>
     <p:sldId id="258" r:id="rId3"/>
-    <p:sldId id="257" r:id="rId4"/>
+    <p:sldId id="259" r:id="rId4"/>
+    <p:sldId id="257" r:id="rId5"/>
   </p:sldIdLst>
   <p:sldSz cx="12192000" cy="6858000"/>
   <p:notesSz cx="6858000" cy="9144000"/>
@@ -245,7 +246,7 @@
           <a:p>
             <a:fld id="{2EE94C4E-79C7-41E1-92E0-239A1D226A2C}" type="datetimeFigureOut">
               <a:rPr lang="pt-BR" smtClean="0"/>
-              <a:t>10/05/2021</a:t>
+              <a:t>12/05/2021</a:t>
             </a:fld>
             <a:endParaRPr lang="pt-BR"/>
           </a:p>
@@ -415,7 +416,7 @@
           <a:p>
             <a:fld id="{2EE94C4E-79C7-41E1-92E0-239A1D226A2C}" type="datetimeFigureOut">
               <a:rPr lang="pt-BR" smtClean="0"/>
-              <a:t>10/05/2021</a:t>
+              <a:t>12/05/2021</a:t>
             </a:fld>
             <a:endParaRPr lang="pt-BR"/>
           </a:p>
@@ -595,7 +596,7 @@
           <a:p>
             <a:fld id="{2EE94C4E-79C7-41E1-92E0-239A1D226A2C}" type="datetimeFigureOut">
               <a:rPr lang="pt-BR" smtClean="0"/>
-              <a:t>10/05/2021</a:t>
+              <a:t>12/05/2021</a:t>
             </a:fld>
             <a:endParaRPr lang="pt-BR"/>
           </a:p>
@@ -765,7 +766,7 @@
           <a:p>
             <a:fld id="{2EE94C4E-79C7-41E1-92E0-239A1D226A2C}" type="datetimeFigureOut">
               <a:rPr lang="pt-BR" smtClean="0"/>
-              <a:t>10/05/2021</a:t>
+              <a:t>12/05/2021</a:t>
             </a:fld>
             <a:endParaRPr lang="pt-BR"/>
           </a:p>
@@ -1011,7 +1012,7 @@
           <a:p>
             <a:fld id="{2EE94C4E-79C7-41E1-92E0-239A1D226A2C}" type="datetimeFigureOut">
               <a:rPr lang="pt-BR" smtClean="0"/>
-              <a:t>10/05/2021</a:t>
+              <a:t>12/05/2021</a:t>
             </a:fld>
             <a:endParaRPr lang="pt-BR"/>
           </a:p>
@@ -1243,7 +1244,7 @@
           <a:p>
             <a:fld id="{2EE94C4E-79C7-41E1-92E0-239A1D226A2C}" type="datetimeFigureOut">
               <a:rPr lang="pt-BR" smtClean="0"/>
-              <a:t>10/05/2021</a:t>
+              <a:t>12/05/2021</a:t>
             </a:fld>
             <a:endParaRPr lang="pt-BR"/>
           </a:p>
@@ -1610,7 +1611,7 @@
           <a:p>
             <a:fld id="{2EE94C4E-79C7-41E1-92E0-239A1D226A2C}" type="datetimeFigureOut">
               <a:rPr lang="pt-BR" smtClean="0"/>
-              <a:t>10/05/2021</a:t>
+              <a:t>12/05/2021</a:t>
             </a:fld>
             <a:endParaRPr lang="pt-BR"/>
           </a:p>
@@ -1728,7 +1729,7 @@
           <a:p>
             <a:fld id="{2EE94C4E-79C7-41E1-92E0-239A1D226A2C}" type="datetimeFigureOut">
               <a:rPr lang="pt-BR" smtClean="0"/>
-              <a:t>10/05/2021</a:t>
+              <a:t>12/05/2021</a:t>
             </a:fld>
             <a:endParaRPr lang="pt-BR"/>
           </a:p>
@@ -1823,7 +1824,7 @@
           <a:p>
             <a:fld id="{2EE94C4E-79C7-41E1-92E0-239A1D226A2C}" type="datetimeFigureOut">
               <a:rPr lang="pt-BR" smtClean="0"/>
-              <a:t>10/05/2021</a:t>
+              <a:t>12/05/2021</a:t>
             </a:fld>
             <a:endParaRPr lang="pt-BR"/>
           </a:p>
@@ -2100,7 +2101,7 @@
           <a:p>
             <a:fld id="{2EE94C4E-79C7-41E1-92E0-239A1D226A2C}" type="datetimeFigureOut">
               <a:rPr lang="pt-BR" smtClean="0"/>
-              <a:t>10/05/2021</a:t>
+              <a:t>12/05/2021</a:t>
             </a:fld>
             <a:endParaRPr lang="pt-BR"/>
           </a:p>
@@ -2353,7 +2354,7 @@
           <a:p>
             <a:fld id="{2EE94C4E-79C7-41E1-92E0-239A1D226A2C}" type="datetimeFigureOut">
               <a:rPr lang="pt-BR" smtClean="0"/>
-              <a:t>10/05/2021</a:t>
+              <a:t>12/05/2021</a:t>
             </a:fld>
             <a:endParaRPr lang="pt-BR"/>
           </a:p>
@@ -2566,7 +2567,7 @@
           <a:p>
             <a:fld id="{2EE94C4E-79C7-41E1-92E0-239A1D226A2C}" type="datetimeFigureOut">
               <a:rPr lang="pt-BR" smtClean="0"/>
-              <a:t>10/05/2021</a:t>
+              <a:t>12/05/2021</a:t>
             </a:fld>
             <a:endParaRPr lang="pt-BR"/>
           </a:p>
@@ -3023,7 +3024,7 @@
         </p:blipFill>
         <p:spPr bwMode="auto">
           <a:xfrm>
-            <a:off x="1726241" y="870188"/>
+            <a:off x="1791555" y="2424668"/>
             <a:ext cx="4210050" cy="3004457"/>
           </a:xfrm>
           <a:prstGeom prst="rect">
@@ -3692,6 +3693,60 @@
 </file>
 
 <file path=ppt/slides/slide3.xml><?xml version="1.0" encoding="utf-8"?>
+<p:sld xmlns:a="http://schemas.openxmlformats.org/drawingml/2006/main" xmlns:r="http://schemas.openxmlformats.org/officeDocument/2006/relationships" xmlns:p="http://schemas.openxmlformats.org/presentationml/2006/main">
+  <p:cSld>
+    <p:spTree>
+      <p:nvGrpSpPr>
+        <p:cNvPr id="1" name=""/>
+        <p:cNvGrpSpPr/>
+        <p:nvPr/>
+      </p:nvGrpSpPr>
+      <p:grpSpPr>
+        <a:xfrm>
+          <a:off x="0" y="0"/>
+          <a:ext cx="0" cy="0"/>
+          <a:chOff x="0" y="0"/>
+          <a:chExt cx="0" cy="0"/>
+        </a:xfrm>
+      </p:grpSpPr>
+      <p:pic>
+        <p:nvPicPr>
+          <p:cNvPr id="5" name="Imagem 4"/>
+          <p:cNvPicPr>
+            <a:picLocks noChangeAspect="1"/>
+          </p:cNvPicPr>
+          <p:nvPr/>
+        </p:nvPicPr>
+        <p:blipFill>
+          <a:blip r:embed="rId2"/>
+          <a:stretch>
+            <a:fillRect/>
+          </a:stretch>
+        </p:blipFill>
+        <p:spPr>
+          <a:xfrm>
+            <a:off x="1750423" y="410679"/>
+            <a:ext cx="8664893" cy="6182934"/>
+          </a:xfrm>
+          <a:prstGeom prst="rect">
+            <a:avLst/>
+          </a:prstGeom>
+        </p:spPr>
+      </p:pic>
+    </p:spTree>
+    <p:extLst>
+      <p:ext uri="{BB962C8B-B14F-4D97-AF65-F5344CB8AC3E}">
+        <p14:creationId xmlns:p14="http://schemas.microsoft.com/office/powerpoint/2010/main" val="2434373344"/>
+      </p:ext>
+    </p:extLst>
+  </p:cSld>
+  <p:clrMapOvr>
+    <a:masterClrMapping/>
+  </p:clrMapOvr>
+</p:sld>
+</file>
+
+<file path=ppt/slides/slide4.xml><?xml version="1.0" encoding="utf-8"?>
 <p:sld xmlns:a="http://schemas.openxmlformats.org/drawingml/2006/main" xmlns:r="http://schemas.openxmlformats.org/officeDocument/2006/relationships" xmlns:p="http://schemas.openxmlformats.org/presentationml/2006/main">
   <p:cSld>
     <p:spTree>

</xml_diff>